<commit_message>
Updated the table with the characteristics of the shor- and long-range forecasts from ERA5
</commit_message>
<xml_diff>
--- a/chapter_03/tables/forecasts_types.pptx
+++ b/chapter_03/tables/forecasts_types.pptx
@@ -2,12 +2,12 @@
 <file path=ppt/presentation.xml><?xml version="1.0" encoding="utf-8"?>
 <p:presentation xmlns:a="http://schemas.openxmlformats.org/drawingml/2006/main" xmlns:r="http://schemas.openxmlformats.org/officeDocument/2006/relationships" xmlns:p="http://schemas.openxmlformats.org/presentationml/2006/main" saveSubsetFonts="1">
   <p:sldMasterIdLst>
-    <p:sldMasterId id="2147483672" r:id="rId1"/>
+    <p:sldMasterId id="2147483696" r:id="rId1"/>
   </p:sldMasterIdLst>
   <p:sldIdLst>
     <p:sldId id="257" r:id="rId2"/>
   </p:sldIdLst>
-  <p:sldSz cx="4140200" cy="1385888"/>
+  <p:sldSz cx="4140200" cy="1709738"/>
   <p:notesSz cx="6858000" cy="9144000"/>
   <p:defaultTextStyle>
     <a:defPPr>
@@ -115,7 +115,7 @@
 <file path=ppt/revisionInfo.xml><?xml version="1.0" encoding="utf-8"?>
 <p1510:revInfo xmlns:a="http://schemas.openxmlformats.org/drawingml/2006/main" xmlns:r="http://schemas.openxmlformats.org/officeDocument/2006/relationships" xmlns:p1510="http://schemas.microsoft.com/office/powerpoint/2015/10/main">
   <p1510:revLst>
-    <p1510:client id="{DC7F69EF-7870-46FC-A397-B1029EF7C406}" v="2" dt="2025-05-13T11:05:49.388"/>
+    <p1510:client id="{9499B2B4-FAAC-435D-8D03-AF2D062895C2}" v="11" dt="2025-05-14T14:14:06.595"/>
   </p1510:revLst>
 </p1510:revInfo>
 </file>
@@ -162,6 +162,70 @@
       </pc:sldChg>
     </pc:docChg>
   </pc:docChgLst>
+  <pc:docChgLst>
+    <pc:chgData name="Fatima Pillosu" userId="a6295d4dc9e22643" providerId="LiveId" clId="{9499B2B4-FAAC-435D-8D03-AF2D062895C2}"/>
+    <pc:docChg chg="undo custSel modSld">
+      <pc:chgData name="Fatima Pillosu" userId="a6295d4dc9e22643" providerId="LiveId" clId="{9499B2B4-FAAC-435D-8D03-AF2D062895C2}" dt="2025-05-14T14:14:17.291" v="450" actId="20577"/>
+      <pc:docMkLst>
+        <pc:docMk/>
+      </pc:docMkLst>
+      <pc:sldChg chg="addSp delSp modSp mod">
+        <pc:chgData name="Fatima Pillosu" userId="a6295d4dc9e22643" providerId="LiveId" clId="{9499B2B4-FAAC-435D-8D03-AF2D062895C2}" dt="2025-05-14T14:14:17.291" v="450" actId="20577"/>
+        <pc:sldMkLst>
+          <pc:docMk/>
+          <pc:sldMk cId="3020345181" sldId="257"/>
+        </pc:sldMkLst>
+        <pc:spChg chg="add del mod">
+          <ac:chgData name="Fatima Pillosu" userId="a6295d4dc9e22643" providerId="LiveId" clId="{9499B2B4-FAAC-435D-8D03-AF2D062895C2}" dt="2025-05-14T14:13:55.823" v="446" actId="21"/>
+          <ac:spMkLst>
+            <pc:docMk/>
+            <pc:sldMk cId="3020345181" sldId="257"/>
+            <ac:spMk id="3" creationId="{BFB118F7-3AF0-A668-608B-98A47405975A}"/>
+          </ac:spMkLst>
+        </pc:spChg>
+        <pc:spChg chg="add del">
+          <ac:chgData name="Fatima Pillosu" userId="a6295d4dc9e22643" providerId="LiveId" clId="{9499B2B4-FAAC-435D-8D03-AF2D062895C2}" dt="2025-05-14T14:13:52.925" v="445" actId="11529"/>
+          <ac:spMkLst>
+            <pc:docMk/>
+            <pc:sldMk cId="3020345181" sldId="257"/>
+            <ac:spMk id="4" creationId="{50632730-3E98-E472-A120-13C9A3B7EC59}"/>
+          </ac:spMkLst>
+        </pc:spChg>
+        <pc:spChg chg="add mod">
+          <ac:chgData name="Fatima Pillosu" userId="a6295d4dc9e22643" providerId="LiveId" clId="{9499B2B4-FAAC-435D-8D03-AF2D062895C2}" dt="2025-05-14T14:14:06.595" v="447"/>
+          <ac:spMkLst>
+            <pc:docMk/>
+            <pc:sldMk cId="3020345181" sldId="257"/>
+            <ac:spMk id="7" creationId="{BFB118F7-3AF0-A668-608B-98A47405975A}"/>
+          </ac:spMkLst>
+        </pc:spChg>
+        <pc:graphicFrameChg chg="add del mod modGraphic">
+          <ac:chgData name="Fatima Pillosu" userId="a6295d4dc9e22643" providerId="LiveId" clId="{9499B2B4-FAAC-435D-8D03-AF2D062895C2}" dt="2025-05-14T14:13:55.823" v="446" actId="21"/>
+          <ac:graphicFrameMkLst>
+            <pc:docMk/>
+            <pc:sldMk cId="3020345181" sldId="257"/>
+            <ac:graphicFrameMk id="2" creationId="{15623DAB-A4E1-DF1C-9B96-E2C1CE9DE49A}"/>
+          </ac:graphicFrameMkLst>
+        </pc:graphicFrameChg>
+        <pc:graphicFrameChg chg="add mod modGraphic">
+          <ac:chgData name="Fatima Pillosu" userId="a6295d4dc9e22643" providerId="LiveId" clId="{9499B2B4-FAAC-435D-8D03-AF2D062895C2}" dt="2025-05-14T14:14:17.291" v="450" actId="20577"/>
+          <ac:graphicFrameMkLst>
+            <pc:docMk/>
+            <pc:sldMk cId="3020345181" sldId="257"/>
+            <ac:graphicFrameMk id="5" creationId="{15623DAB-A4E1-DF1C-9B96-E2C1CE9DE49A}"/>
+          </ac:graphicFrameMkLst>
+        </pc:graphicFrameChg>
+        <pc:graphicFrameChg chg="del modGraphic">
+          <ac:chgData name="Fatima Pillosu" userId="a6295d4dc9e22643" providerId="LiveId" clId="{9499B2B4-FAAC-435D-8D03-AF2D062895C2}" dt="2025-05-14T13:56:26.809" v="3" actId="21"/>
+          <ac:graphicFrameMkLst>
+            <pc:docMk/>
+            <pc:sldMk cId="3020345181" sldId="257"/>
+            <ac:graphicFrameMk id="6" creationId="{15623DAB-A4E1-DF1C-9B96-E2C1CE9DE49A}"/>
+          </ac:graphicFrameMkLst>
+        </pc:graphicFrameChg>
+      </pc:sldChg>
+    </pc:docChg>
+  </pc:docChgLst>
 </pc:chgInfo>
 </file>
 
@@ -194,15 +258,15 @@
         </p:nvSpPr>
         <p:spPr>
           <a:xfrm>
-            <a:off x="517525" y="226811"/>
-            <a:ext cx="3105150" cy="482494"/>
+            <a:off x="517525" y="279811"/>
+            <a:ext cx="3105150" cy="595242"/>
           </a:xfrm>
         </p:spPr>
         <p:txBody>
           <a:bodyPr anchor="b"/>
           <a:lstStyle>
             <a:lvl1pPr algn="ctr">
-              <a:defRPr sz="1213"/>
+              <a:defRPr sz="1496"/>
             </a:lvl1pPr>
           </a:lstStyle>
           <a:p>
@@ -226,8 +290,8 @@
         </p:nvSpPr>
         <p:spPr>
           <a:xfrm>
-            <a:off x="517525" y="727912"/>
-            <a:ext cx="3105150" cy="334602"/>
+            <a:off x="517525" y="898008"/>
+            <a:ext cx="3105150" cy="412791"/>
           </a:xfrm>
         </p:spPr>
         <p:txBody>
@@ -235,39 +299,39 @@
           <a:lstStyle>
             <a:lvl1pPr marL="0" indent="0" algn="ctr">
               <a:buNone/>
-              <a:defRPr sz="485"/>
+              <a:defRPr sz="598"/>
             </a:lvl1pPr>
-            <a:lvl2pPr marL="92400" indent="0" algn="ctr">
-              <a:buNone/>
-              <a:defRPr sz="404"/>
+            <a:lvl2pPr marL="113980" indent="0" algn="ctr">
+              <a:buNone/>
+              <a:defRPr sz="499"/>
             </a:lvl2pPr>
-            <a:lvl3pPr marL="184800" indent="0" algn="ctr">
-              <a:buNone/>
-              <a:defRPr sz="364"/>
+            <a:lvl3pPr marL="227960" indent="0" algn="ctr">
+              <a:buNone/>
+              <a:defRPr sz="449"/>
             </a:lvl3pPr>
-            <a:lvl4pPr marL="277200" indent="0" algn="ctr">
-              <a:buNone/>
-              <a:defRPr sz="323"/>
+            <a:lvl4pPr marL="341940" indent="0" algn="ctr">
+              <a:buNone/>
+              <a:defRPr sz="399"/>
             </a:lvl4pPr>
-            <a:lvl5pPr marL="369600" indent="0" algn="ctr">
-              <a:buNone/>
-              <a:defRPr sz="323"/>
+            <a:lvl5pPr marL="455920" indent="0" algn="ctr">
+              <a:buNone/>
+              <a:defRPr sz="399"/>
             </a:lvl5pPr>
-            <a:lvl6pPr marL="462001" indent="0" algn="ctr">
-              <a:buNone/>
-              <a:defRPr sz="323"/>
+            <a:lvl6pPr marL="569900" indent="0" algn="ctr">
+              <a:buNone/>
+              <a:defRPr sz="399"/>
             </a:lvl6pPr>
-            <a:lvl7pPr marL="554401" indent="0" algn="ctr">
-              <a:buNone/>
-              <a:defRPr sz="323"/>
+            <a:lvl7pPr marL="683880" indent="0" algn="ctr">
+              <a:buNone/>
+              <a:defRPr sz="399"/>
             </a:lvl7pPr>
-            <a:lvl8pPr marL="646801" indent="0" algn="ctr">
-              <a:buNone/>
-              <a:defRPr sz="323"/>
+            <a:lvl8pPr marL="797860" indent="0" algn="ctr">
+              <a:buNone/>
+              <a:defRPr sz="399"/>
             </a:lvl8pPr>
-            <a:lvl9pPr marL="739201" indent="0" algn="ctr">
-              <a:buNone/>
-              <a:defRPr sz="323"/>
+            <a:lvl9pPr marL="911840" indent="0" algn="ctr">
+              <a:buNone/>
+              <a:defRPr sz="399"/>
             </a:lvl9pPr>
           </a:lstStyle>
           <a:p>
@@ -296,7 +360,7 @@
           <a:p>
             <a:fld id="{1FB3EBC5-2BAE-4ECB-A995-B52653FE7498}" type="datetimeFigureOut">
               <a:rPr lang="en-GB" smtClean="0"/>
-              <a:t>13/05/2025</a:t>
+              <a:t>14/05/2025</a:t>
             </a:fld>
             <a:endParaRPr lang="en-GB"/>
           </a:p>
@@ -347,7 +411,7 @@
     </p:spTree>
     <p:extLst>
       <p:ext uri="{BB962C8B-B14F-4D97-AF65-F5344CB8AC3E}">
-        <p14:creationId xmlns:p14="http://schemas.microsoft.com/office/powerpoint/2010/main" val="1805628260"/>
+        <p14:creationId xmlns:p14="http://schemas.microsoft.com/office/powerpoint/2010/main" val="1776408261"/>
       </p:ext>
     </p:extLst>
   </p:cSld>
@@ -466,7 +530,7 @@
           <a:p>
             <a:fld id="{1FB3EBC5-2BAE-4ECB-A995-B52653FE7498}" type="datetimeFigureOut">
               <a:rPr lang="en-GB" smtClean="0"/>
-              <a:t>13/05/2025</a:t>
+              <a:t>14/05/2025</a:t>
             </a:fld>
             <a:endParaRPr lang="en-GB"/>
           </a:p>
@@ -517,7 +581,7 @@
     </p:spTree>
     <p:extLst>
       <p:ext uri="{BB962C8B-B14F-4D97-AF65-F5344CB8AC3E}">
-        <p14:creationId xmlns:p14="http://schemas.microsoft.com/office/powerpoint/2010/main" val="3680204267"/>
+        <p14:creationId xmlns:p14="http://schemas.microsoft.com/office/powerpoint/2010/main" val="4061666382"/>
       </p:ext>
     </p:extLst>
   </p:cSld>
@@ -556,8 +620,8 @@
         </p:nvSpPr>
         <p:spPr>
           <a:xfrm>
-            <a:off x="2962830" y="73786"/>
-            <a:ext cx="892731" cy="1174476"/>
+            <a:off x="2962830" y="91028"/>
+            <a:ext cx="892731" cy="1448924"/>
           </a:xfrm>
         </p:spPr>
         <p:txBody>
@@ -584,8 +648,8 @@
         </p:nvSpPr>
         <p:spPr>
           <a:xfrm>
-            <a:off x="284639" y="73786"/>
-            <a:ext cx="2626439" cy="1174476"/>
+            <a:off x="284639" y="91028"/>
+            <a:ext cx="2626439" cy="1448924"/>
           </a:xfrm>
         </p:spPr>
         <p:txBody>
@@ -646,7 +710,7 @@
           <a:p>
             <a:fld id="{1FB3EBC5-2BAE-4ECB-A995-B52653FE7498}" type="datetimeFigureOut">
               <a:rPr lang="en-GB" smtClean="0"/>
-              <a:t>13/05/2025</a:t>
+              <a:t>14/05/2025</a:t>
             </a:fld>
             <a:endParaRPr lang="en-GB"/>
           </a:p>
@@ -697,7 +761,7 @@
     </p:spTree>
     <p:extLst>
       <p:ext uri="{BB962C8B-B14F-4D97-AF65-F5344CB8AC3E}">
-        <p14:creationId xmlns:p14="http://schemas.microsoft.com/office/powerpoint/2010/main" val="2807402546"/>
+        <p14:creationId xmlns:p14="http://schemas.microsoft.com/office/powerpoint/2010/main" val="3327515005"/>
       </p:ext>
     </p:extLst>
   </p:cSld>
@@ -816,7 +880,7 @@
           <a:p>
             <a:fld id="{1FB3EBC5-2BAE-4ECB-A995-B52653FE7498}" type="datetimeFigureOut">
               <a:rPr lang="en-GB" smtClean="0"/>
-              <a:t>13/05/2025</a:t>
+              <a:t>14/05/2025</a:t>
             </a:fld>
             <a:endParaRPr lang="en-GB"/>
           </a:p>
@@ -867,7 +931,7 @@
     </p:spTree>
     <p:extLst>
       <p:ext uri="{BB962C8B-B14F-4D97-AF65-F5344CB8AC3E}">
-        <p14:creationId xmlns:p14="http://schemas.microsoft.com/office/powerpoint/2010/main" val="1430711758"/>
+        <p14:creationId xmlns:p14="http://schemas.microsoft.com/office/powerpoint/2010/main" val="1070920785"/>
       </p:ext>
     </p:extLst>
   </p:cSld>
@@ -906,15 +970,15 @@
         </p:nvSpPr>
         <p:spPr>
           <a:xfrm>
-            <a:off x="282482" y="345510"/>
-            <a:ext cx="3570923" cy="576491"/>
+            <a:off x="282482" y="426248"/>
+            <a:ext cx="3570923" cy="711203"/>
           </a:xfrm>
         </p:spPr>
         <p:txBody>
           <a:bodyPr anchor="b"/>
           <a:lstStyle>
             <a:lvl1pPr>
-              <a:defRPr sz="1213"/>
+              <a:defRPr sz="1496"/>
             </a:lvl1pPr>
           </a:lstStyle>
           <a:p>
@@ -938,8 +1002,8 @@
         </p:nvSpPr>
         <p:spPr>
           <a:xfrm>
-            <a:off x="282482" y="927454"/>
-            <a:ext cx="3570923" cy="303163"/>
+            <a:off x="282482" y="1144179"/>
+            <a:ext cx="3570923" cy="374005"/>
           </a:xfrm>
         </p:spPr>
         <p:txBody>
@@ -947,7 +1011,7 @@
           <a:lstStyle>
             <a:lvl1pPr marL="0" indent="0">
               <a:buNone/>
-              <a:defRPr sz="485">
+              <a:defRPr sz="598">
                 <a:solidFill>
                   <a:schemeClr val="tx1">
                     <a:tint val="82000"/>
@@ -955,9 +1019,9 @@
                 </a:solidFill>
               </a:defRPr>
             </a:lvl1pPr>
-            <a:lvl2pPr marL="92400" indent="0">
-              <a:buNone/>
-              <a:defRPr sz="404">
+            <a:lvl2pPr marL="113980" indent="0">
+              <a:buNone/>
+              <a:defRPr sz="499">
                 <a:solidFill>
                   <a:schemeClr val="tx1">
                     <a:tint val="82000"/>
@@ -965,9 +1029,9 @@
                 </a:solidFill>
               </a:defRPr>
             </a:lvl2pPr>
-            <a:lvl3pPr marL="184800" indent="0">
-              <a:buNone/>
-              <a:defRPr sz="364">
+            <a:lvl3pPr marL="227960" indent="0">
+              <a:buNone/>
+              <a:defRPr sz="449">
                 <a:solidFill>
                   <a:schemeClr val="tx1">
                     <a:tint val="82000"/>
@@ -975,9 +1039,9 @@
                 </a:solidFill>
               </a:defRPr>
             </a:lvl3pPr>
-            <a:lvl4pPr marL="277200" indent="0">
-              <a:buNone/>
-              <a:defRPr sz="323">
+            <a:lvl4pPr marL="341940" indent="0">
+              <a:buNone/>
+              <a:defRPr sz="399">
                 <a:solidFill>
                   <a:schemeClr val="tx1">
                     <a:tint val="82000"/>
@@ -985,9 +1049,9 @@
                 </a:solidFill>
               </a:defRPr>
             </a:lvl4pPr>
-            <a:lvl5pPr marL="369600" indent="0">
-              <a:buNone/>
-              <a:defRPr sz="323">
+            <a:lvl5pPr marL="455920" indent="0">
+              <a:buNone/>
+              <a:defRPr sz="399">
                 <a:solidFill>
                   <a:schemeClr val="tx1">
                     <a:tint val="82000"/>
@@ -995,9 +1059,9 @@
                 </a:solidFill>
               </a:defRPr>
             </a:lvl5pPr>
-            <a:lvl6pPr marL="462001" indent="0">
-              <a:buNone/>
-              <a:defRPr sz="323">
+            <a:lvl6pPr marL="569900" indent="0">
+              <a:buNone/>
+              <a:defRPr sz="399">
                 <a:solidFill>
                   <a:schemeClr val="tx1">
                     <a:tint val="82000"/>
@@ -1005,9 +1069,9 @@
                 </a:solidFill>
               </a:defRPr>
             </a:lvl6pPr>
-            <a:lvl7pPr marL="554401" indent="0">
-              <a:buNone/>
-              <a:defRPr sz="323">
+            <a:lvl7pPr marL="683880" indent="0">
+              <a:buNone/>
+              <a:defRPr sz="399">
                 <a:solidFill>
                   <a:schemeClr val="tx1">
                     <a:tint val="82000"/>
@@ -1015,9 +1079,9 @@
                 </a:solidFill>
               </a:defRPr>
             </a:lvl7pPr>
-            <a:lvl8pPr marL="646801" indent="0">
-              <a:buNone/>
-              <a:defRPr sz="323">
+            <a:lvl8pPr marL="797860" indent="0">
+              <a:buNone/>
+              <a:defRPr sz="399">
                 <a:solidFill>
                   <a:schemeClr val="tx1">
                     <a:tint val="82000"/>
@@ -1025,9 +1089,9 @@
                 </a:solidFill>
               </a:defRPr>
             </a:lvl8pPr>
-            <a:lvl9pPr marL="739201" indent="0">
-              <a:buNone/>
-              <a:defRPr sz="323">
+            <a:lvl9pPr marL="911840" indent="0">
+              <a:buNone/>
+              <a:defRPr sz="399">
                 <a:solidFill>
                   <a:schemeClr val="tx1">
                     <a:tint val="82000"/>
@@ -1062,7 +1126,7 @@
           <a:p>
             <a:fld id="{1FB3EBC5-2BAE-4ECB-A995-B52653FE7498}" type="datetimeFigureOut">
               <a:rPr lang="en-GB" smtClean="0"/>
-              <a:t>13/05/2025</a:t>
+              <a:t>14/05/2025</a:t>
             </a:fld>
             <a:endParaRPr lang="en-GB"/>
           </a:p>
@@ -1113,7 +1177,7 @@
     </p:spTree>
     <p:extLst>
       <p:ext uri="{BB962C8B-B14F-4D97-AF65-F5344CB8AC3E}">
-        <p14:creationId xmlns:p14="http://schemas.microsoft.com/office/powerpoint/2010/main" val="3074219239"/>
+        <p14:creationId xmlns:p14="http://schemas.microsoft.com/office/powerpoint/2010/main" val="3158543502"/>
       </p:ext>
     </p:extLst>
   </p:cSld>
@@ -1175,8 +1239,8 @@
         </p:nvSpPr>
         <p:spPr>
           <a:xfrm>
-            <a:off x="284639" y="368929"/>
-            <a:ext cx="1759585" cy="879333"/>
+            <a:off x="284639" y="455139"/>
+            <a:ext cx="1759585" cy="1084813"/>
           </a:xfrm>
         </p:spPr>
         <p:txBody>
@@ -1232,8 +1296,8 @@
         </p:nvSpPr>
         <p:spPr>
           <a:xfrm>
-            <a:off x="2095976" y="368929"/>
-            <a:ext cx="1759585" cy="879333"/>
+            <a:off x="2095976" y="455139"/>
+            <a:ext cx="1759585" cy="1084813"/>
           </a:xfrm>
         </p:spPr>
         <p:txBody>
@@ -1294,7 +1358,7 @@
           <a:p>
             <a:fld id="{1FB3EBC5-2BAE-4ECB-A995-B52653FE7498}" type="datetimeFigureOut">
               <a:rPr lang="en-GB" smtClean="0"/>
-              <a:t>13/05/2025</a:t>
+              <a:t>14/05/2025</a:t>
             </a:fld>
             <a:endParaRPr lang="en-GB"/>
           </a:p>
@@ -1345,7 +1409,7 @@
     </p:spTree>
     <p:extLst>
       <p:ext uri="{BB962C8B-B14F-4D97-AF65-F5344CB8AC3E}">
-        <p14:creationId xmlns:p14="http://schemas.microsoft.com/office/powerpoint/2010/main" val="170515589"/>
+        <p14:creationId xmlns:p14="http://schemas.microsoft.com/office/powerpoint/2010/main" val="1138394147"/>
       </p:ext>
     </p:extLst>
   </p:cSld>
@@ -1384,8 +1448,8 @@
         </p:nvSpPr>
         <p:spPr>
           <a:xfrm>
-            <a:off x="285178" y="73786"/>
-            <a:ext cx="3570923" cy="267874"/>
+            <a:off x="285178" y="91028"/>
+            <a:ext cx="3570923" cy="330470"/>
           </a:xfrm>
         </p:spPr>
         <p:txBody>
@@ -1412,8 +1476,8 @@
         </p:nvSpPr>
         <p:spPr>
           <a:xfrm>
-            <a:off x="285178" y="339735"/>
-            <a:ext cx="1751499" cy="166499"/>
+            <a:off x="285178" y="419123"/>
+            <a:ext cx="1751499" cy="205406"/>
           </a:xfrm>
         </p:spPr>
         <p:txBody>
@@ -1421,39 +1485,39 @@
           <a:lstStyle>
             <a:lvl1pPr marL="0" indent="0">
               <a:buNone/>
-              <a:defRPr sz="485" b="1"/>
+              <a:defRPr sz="598" b="1"/>
             </a:lvl1pPr>
-            <a:lvl2pPr marL="92400" indent="0">
-              <a:buNone/>
-              <a:defRPr sz="404" b="1"/>
+            <a:lvl2pPr marL="113980" indent="0">
+              <a:buNone/>
+              <a:defRPr sz="499" b="1"/>
             </a:lvl2pPr>
-            <a:lvl3pPr marL="184800" indent="0">
-              <a:buNone/>
-              <a:defRPr sz="364" b="1"/>
+            <a:lvl3pPr marL="227960" indent="0">
+              <a:buNone/>
+              <a:defRPr sz="449" b="1"/>
             </a:lvl3pPr>
-            <a:lvl4pPr marL="277200" indent="0">
-              <a:buNone/>
-              <a:defRPr sz="323" b="1"/>
+            <a:lvl4pPr marL="341940" indent="0">
+              <a:buNone/>
+              <a:defRPr sz="399" b="1"/>
             </a:lvl4pPr>
-            <a:lvl5pPr marL="369600" indent="0">
-              <a:buNone/>
-              <a:defRPr sz="323" b="1"/>
+            <a:lvl5pPr marL="455920" indent="0">
+              <a:buNone/>
+              <a:defRPr sz="399" b="1"/>
             </a:lvl5pPr>
-            <a:lvl6pPr marL="462001" indent="0">
-              <a:buNone/>
-              <a:defRPr sz="323" b="1"/>
+            <a:lvl6pPr marL="569900" indent="0">
+              <a:buNone/>
+              <a:defRPr sz="399" b="1"/>
             </a:lvl6pPr>
-            <a:lvl7pPr marL="554401" indent="0">
-              <a:buNone/>
-              <a:defRPr sz="323" b="1"/>
+            <a:lvl7pPr marL="683880" indent="0">
+              <a:buNone/>
+              <a:defRPr sz="399" b="1"/>
             </a:lvl7pPr>
-            <a:lvl8pPr marL="646801" indent="0">
-              <a:buNone/>
-              <a:defRPr sz="323" b="1"/>
+            <a:lvl8pPr marL="797860" indent="0">
+              <a:buNone/>
+              <a:defRPr sz="399" b="1"/>
             </a:lvl8pPr>
-            <a:lvl9pPr marL="739201" indent="0">
-              <a:buNone/>
-              <a:defRPr sz="323" b="1"/>
+            <a:lvl9pPr marL="911840" indent="0">
+              <a:buNone/>
+              <a:defRPr sz="399" b="1"/>
             </a:lvl9pPr>
           </a:lstStyle>
           <a:p>
@@ -1477,8 +1541,8 @@
         </p:nvSpPr>
         <p:spPr>
           <a:xfrm>
-            <a:off x="285178" y="506234"/>
-            <a:ext cx="1751499" cy="744594"/>
+            <a:off x="285178" y="624529"/>
+            <a:ext cx="1751499" cy="918589"/>
           </a:xfrm>
         </p:spPr>
         <p:txBody>
@@ -1534,8 +1598,8 @@
         </p:nvSpPr>
         <p:spPr>
           <a:xfrm>
-            <a:off x="2095976" y="339735"/>
-            <a:ext cx="1760124" cy="166499"/>
+            <a:off x="2095976" y="419123"/>
+            <a:ext cx="1760124" cy="205406"/>
           </a:xfrm>
         </p:spPr>
         <p:txBody>
@@ -1543,39 +1607,39 @@
           <a:lstStyle>
             <a:lvl1pPr marL="0" indent="0">
               <a:buNone/>
-              <a:defRPr sz="485" b="1"/>
+              <a:defRPr sz="598" b="1"/>
             </a:lvl1pPr>
-            <a:lvl2pPr marL="92400" indent="0">
-              <a:buNone/>
-              <a:defRPr sz="404" b="1"/>
+            <a:lvl2pPr marL="113980" indent="0">
+              <a:buNone/>
+              <a:defRPr sz="499" b="1"/>
             </a:lvl2pPr>
-            <a:lvl3pPr marL="184800" indent="0">
-              <a:buNone/>
-              <a:defRPr sz="364" b="1"/>
+            <a:lvl3pPr marL="227960" indent="0">
+              <a:buNone/>
+              <a:defRPr sz="449" b="1"/>
             </a:lvl3pPr>
-            <a:lvl4pPr marL="277200" indent="0">
-              <a:buNone/>
-              <a:defRPr sz="323" b="1"/>
+            <a:lvl4pPr marL="341940" indent="0">
+              <a:buNone/>
+              <a:defRPr sz="399" b="1"/>
             </a:lvl4pPr>
-            <a:lvl5pPr marL="369600" indent="0">
-              <a:buNone/>
-              <a:defRPr sz="323" b="1"/>
+            <a:lvl5pPr marL="455920" indent="0">
+              <a:buNone/>
+              <a:defRPr sz="399" b="1"/>
             </a:lvl5pPr>
-            <a:lvl6pPr marL="462001" indent="0">
-              <a:buNone/>
-              <a:defRPr sz="323" b="1"/>
+            <a:lvl6pPr marL="569900" indent="0">
+              <a:buNone/>
+              <a:defRPr sz="399" b="1"/>
             </a:lvl6pPr>
-            <a:lvl7pPr marL="554401" indent="0">
-              <a:buNone/>
-              <a:defRPr sz="323" b="1"/>
+            <a:lvl7pPr marL="683880" indent="0">
+              <a:buNone/>
+              <a:defRPr sz="399" b="1"/>
             </a:lvl7pPr>
-            <a:lvl8pPr marL="646801" indent="0">
-              <a:buNone/>
-              <a:defRPr sz="323" b="1"/>
+            <a:lvl8pPr marL="797860" indent="0">
+              <a:buNone/>
+              <a:defRPr sz="399" b="1"/>
             </a:lvl8pPr>
-            <a:lvl9pPr marL="739201" indent="0">
-              <a:buNone/>
-              <a:defRPr sz="323" b="1"/>
+            <a:lvl9pPr marL="911840" indent="0">
+              <a:buNone/>
+              <a:defRPr sz="399" b="1"/>
             </a:lvl9pPr>
           </a:lstStyle>
           <a:p>
@@ -1599,8 +1663,8 @@
         </p:nvSpPr>
         <p:spPr>
           <a:xfrm>
-            <a:off x="2095976" y="506234"/>
-            <a:ext cx="1760124" cy="744594"/>
+            <a:off x="2095976" y="624529"/>
+            <a:ext cx="1760124" cy="918589"/>
           </a:xfrm>
         </p:spPr>
         <p:txBody>
@@ -1661,7 +1725,7 @@
           <a:p>
             <a:fld id="{1FB3EBC5-2BAE-4ECB-A995-B52653FE7498}" type="datetimeFigureOut">
               <a:rPr lang="en-GB" smtClean="0"/>
-              <a:t>13/05/2025</a:t>
+              <a:t>14/05/2025</a:t>
             </a:fld>
             <a:endParaRPr lang="en-GB"/>
           </a:p>
@@ -1712,7 +1776,7 @@
     </p:spTree>
     <p:extLst>
       <p:ext uri="{BB962C8B-B14F-4D97-AF65-F5344CB8AC3E}">
-        <p14:creationId xmlns:p14="http://schemas.microsoft.com/office/powerpoint/2010/main" val="2424626969"/>
+        <p14:creationId xmlns:p14="http://schemas.microsoft.com/office/powerpoint/2010/main" val="3217940217"/>
       </p:ext>
     </p:extLst>
   </p:cSld>
@@ -1779,7 +1843,7 @@
           <a:p>
             <a:fld id="{1FB3EBC5-2BAE-4ECB-A995-B52653FE7498}" type="datetimeFigureOut">
               <a:rPr lang="en-GB" smtClean="0"/>
-              <a:t>13/05/2025</a:t>
+              <a:t>14/05/2025</a:t>
             </a:fld>
             <a:endParaRPr lang="en-GB"/>
           </a:p>
@@ -1830,7 +1894,7 @@
     </p:spTree>
     <p:extLst>
       <p:ext uri="{BB962C8B-B14F-4D97-AF65-F5344CB8AC3E}">
-        <p14:creationId xmlns:p14="http://schemas.microsoft.com/office/powerpoint/2010/main" val="147174288"/>
+        <p14:creationId xmlns:p14="http://schemas.microsoft.com/office/powerpoint/2010/main" val="1380427904"/>
       </p:ext>
     </p:extLst>
   </p:cSld>
@@ -1874,7 +1938,7 @@
           <a:p>
             <a:fld id="{1FB3EBC5-2BAE-4ECB-A995-B52653FE7498}" type="datetimeFigureOut">
               <a:rPr lang="en-GB" smtClean="0"/>
-              <a:t>13/05/2025</a:t>
+              <a:t>14/05/2025</a:t>
             </a:fld>
             <a:endParaRPr lang="en-GB"/>
           </a:p>
@@ -1925,7 +1989,7 @@
     </p:spTree>
     <p:extLst>
       <p:ext uri="{BB962C8B-B14F-4D97-AF65-F5344CB8AC3E}">
-        <p14:creationId xmlns:p14="http://schemas.microsoft.com/office/powerpoint/2010/main" val="2098685754"/>
+        <p14:creationId xmlns:p14="http://schemas.microsoft.com/office/powerpoint/2010/main" val="3182640758"/>
       </p:ext>
     </p:extLst>
   </p:cSld>
@@ -1964,15 +2028,15 @@
         </p:nvSpPr>
         <p:spPr>
           <a:xfrm>
-            <a:off x="285178" y="92392"/>
-            <a:ext cx="1335322" cy="323374"/>
+            <a:off x="285178" y="113982"/>
+            <a:ext cx="1335322" cy="398939"/>
           </a:xfrm>
         </p:spPr>
         <p:txBody>
           <a:bodyPr anchor="b"/>
           <a:lstStyle>
             <a:lvl1pPr>
-              <a:defRPr sz="647"/>
+              <a:defRPr sz="798"/>
             </a:lvl1pPr>
           </a:lstStyle>
           <a:p>
@@ -1996,39 +2060,39 @@
         </p:nvSpPr>
         <p:spPr>
           <a:xfrm>
-            <a:off x="1760124" y="199542"/>
-            <a:ext cx="2095976" cy="984879"/>
+            <a:off x="1760124" y="246171"/>
+            <a:ext cx="2095976" cy="1215022"/>
           </a:xfrm>
         </p:spPr>
         <p:txBody>
           <a:bodyPr/>
           <a:lstStyle>
             <a:lvl1pPr>
-              <a:defRPr sz="647"/>
+              <a:defRPr sz="798"/>
             </a:lvl1pPr>
             <a:lvl2pPr>
-              <a:defRPr sz="566"/>
+              <a:defRPr sz="698"/>
             </a:lvl2pPr>
             <a:lvl3pPr>
-              <a:defRPr sz="485"/>
+              <a:defRPr sz="598"/>
             </a:lvl3pPr>
             <a:lvl4pPr>
-              <a:defRPr sz="404"/>
+              <a:defRPr sz="499"/>
             </a:lvl4pPr>
             <a:lvl5pPr>
-              <a:defRPr sz="404"/>
+              <a:defRPr sz="499"/>
             </a:lvl5pPr>
             <a:lvl6pPr>
-              <a:defRPr sz="404"/>
+              <a:defRPr sz="499"/>
             </a:lvl6pPr>
             <a:lvl7pPr>
-              <a:defRPr sz="404"/>
+              <a:defRPr sz="499"/>
             </a:lvl7pPr>
             <a:lvl8pPr>
-              <a:defRPr sz="404"/>
+              <a:defRPr sz="499"/>
             </a:lvl8pPr>
             <a:lvl9pPr>
-              <a:defRPr sz="404"/>
+              <a:defRPr sz="499"/>
             </a:lvl9pPr>
           </a:lstStyle>
           <a:p>
@@ -2081,8 +2145,8 @@
         </p:nvSpPr>
         <p:spPr>
           <a:xfrm>
-            <a:off x="285178" y="415766"/>
-            <a:ext cx="1335322" cy="770259"/>
+            <a:off x="285178" y="512922"/>
+            <a:ext cx="1335322" cy="950250"/>
           </a:xfrm>
         </p:spPr>
         <p:txBody>
@@ -2090,39 +2154,39 @@
           <a:lstStyle>
             <a:lvl1pPr marL="0" indent="0">
               <a:buNone/>
-              <a:defRPr sz="323"/>
+              <a:defRPr sz="399"/>
             </a:lvl1pPr>
-            <a:lvl2pPr marL="92400" indent="0">
-              <a:buNone/>
-              <a:defRPr sz="283"/>
+            <a:lvl2pPr marL="113980" indent="0">
+              <a:buNone/>
+              <a:defRPr sz="349"/>
             </a:lvl2pPr>
-            <a:lvl3pPr marL="184800" indent="0">
-              <a:buNone/>
-              <a:defRPr sz="243"/>
+            <a:lvl3pPr marL="227960" indent="0">
+              <a:buNone/>
+              <a:defRPr sz="299"/>
             </a:lvl3pPr>
-            <a:lvl4pPr marL="277200" indent="0">
-              <a:buNone/>
-              <a:defRPr sz="202"/>
+            <a:lvl4pPr marL="341940" indent="0">
+              <a:buNone/>
+              <a:defRPr sz="249"/>
             </a:lvl4pPr>
-            <a:lvl5pPr marL="369600" indent="0">
-              <a:buNone/>
-              <a:defRPr sz="202"/>
+            <a:lvl5pPr marL="455920" indent="0">
+              <a:buNone/>
+              <a:defRPr sz="249"/>
             </a:lvl5pPr>
-            <a:lvl6pPr marL="462001" indent="0">
-              <a:buNone/>
-              <a:defRPr sz="202"/>
+            <a:lvl6pPr marL="569900" indent="0">
+              <a:buNone/>
+              <a:defRPr sz="249"/>
             </a:lvl6pPr>
-            <a:lvl7pPr marL="554401" indent="0">
-              <a:buNone/>
-              <a:defRPr sz="202"/>
+            <a:lvl7pPr marL="683880" indent="0">
+              <a:buNone/>
+              <a:defRPr sz="249"/>
             </a:lvl7pPr>
-            <a:lvl8pPr marL="646801" indent="0">
-              <a:buNone/>
-              <a:defRPr sz="202"/>
+            <a:lvl8pPr marL="797860" indent="0">
+              <a:buNone/>
+              <a:defRPr sz="249"/>
             </a:lvl8pPr>
-            <a:lvl9pPr marL="739201" indent="0">
-              <a:buNone/>
-              <a:defRPr sz="202"/>
+            <a:lvl9pPr marL="911840" indent="0">
+              <a:buNone/>
+              <a:defRPr sz="249"/>
             </a:lvl9pPr>
           </a:lstStyle>
           <a:p>
@@ -2151,7 +2215,7 @@
           <a:p>
             <a:fld id="{1FB3EBC5-2BAE-4ECB-A995-B52653FE7498}" type="datetimeFigureOut">
               <a:rPr lang="en-GB" smtClean="0"/>
-              <a:t>13/05/2025</a:t>
+              <a:t>14/05/2025</a:t>
             </a:fld>
             <a:endParaRPr lang="en-GB"/>
           </a:p>
@@ -2202,7 +2266,7 @@
     </p:spTree>
     <p:extLst>
       <p:ext uri="{BB962C8B-B14F-4D97-AF65-F5344CB8AC3E}">
-        <p14:creationId xmlns:p14="http://schemas.microsoft.com/office/powerpoint/2010/main" val="938292227"/>
+        <p14:creationId xmlns:p14="http://schemas.microsoft.com/office/powerpoint/2010/main" val="1133340083"/>
       </p:ext>
     </p:extLst>
   </p:cSld>
@@ -2241,15 +2305,15 @@
         </p:nvSpPr>
         <p:spPr>
           <a:xfrm>
-            <a:off x="285178" y="92392"/>
-            <a:ext cx="1335322" cy="323374"/>
+            <a:off x="285178" y="113982"/>
+            <a:ext cx="1335322" cy="398939"/>
           </a:xfrm>
         </p:spPr>
         <p:txBody>
           <a:bodyPr anchor="b"/>
           <a:lstStyle>
             <a:lvl1pPr>
-              <a:defRPr sz="647"/>
+              <a:defRPr sz="798"/>
             </a:lvl1pPr>
           </a:lstStyle>
           <a:p>
@@ -2273,8 +2337,8 @@
         </p:nvSpPr>
         <p:spPr>
           <a:xfrm>
-            <a:off x="1760124" y="199542"/>
-            <a:ext cx="2095976" cy="984879"/>
+            <a:off x="1760124" y="246171"/>
+            <a:ext cx="2095976" cy="1215022"/>
           </a:xfrm>
         </p:spPr>
         <p:txBody>
@@ -2282,39 +2346,39 @@
           <a:lstStyle>
             <a:lvl1pPr marL="0" indent="0">
               <a:buNone/>
-              <a:defRPr sz="647"/>
+              <a:defRPr sz="798"/>
             </a:lvl1pPr>
-            <a:lvl2pPr marL="92400" indent="0">
-              <a:buNone/>
-              <a:defRPr sz="566"/>
+            <a:lvl2pPr marL="113980" indent="0">
+              <a:buNone/>
+              <a:defRPr sz="698"/>
             </a:lvl2pPr>
-            <a:lvl3pPr marL="184800" indent="0">
-              <a:buNone/>
-              <a:defRPr sz="485"/>
+            <a:lvl3pPr marL="227960" indent="0">
+              <a:buNone/>
+              <a:defRPr sz="598"/>
             </a:lvl3pPr>
-            <a:lvl4pPr marL="277200" indent="0">
-              <a:buNone/>
-              <a:defRPr sz="404"/>
+            <a:lvl4pPr marL="341940" indent="0">
+              <a:buNone/>
+              <a:defRPr sz="499"/>
             </a:lvl4pPr>
-            <a:lvl5pPr marL="369600" indent="0">
-              <a:buNone/>
-              <a:defRPr sz="404"/>
+            <a:lvl5pPr marL="455920" indent="0">
+              <a:buNone/>
+              <a:defRPr sz="499"/>
             </a:lvl5pPr>
-            <a:lvl6pPr marL="462001" indent="0">
-              <a:buNone/>
-              <a:defRPr sz="404"/>
+            <a:lvl6pPr marL="569900" indent="0">
+              <a:buNone/>
+              <a:defRPr sz="499"/>
             </a:lvl6pPr>
-            <a:lvl7pPr marL="554401" indent="0">
-              <a:buNone/>
-              <a:defRPr sz="404"/>
+            <a:lvl7pPr marL="683880" indent="0">
+              <a:buNone/>
+              <a:defRPr sz="499"/>
             </a:lvl7pPr>
-            <a:lvl8pPr marL="646801" indent="0">
-              <a:buNone/>
-              <a:defRPr sz="404"/>
+            <a:lvl8pPr marL="797860" indent="0">
+              <a:buNone/>
+              <a:defRPr sz="499"/>
             </a:lvl8pPr>
-            <a:lvl9pPr marL="739201" indent="0">
-              <a:buNone/>
-              <a:defRPr sz="404"/>
+            <a:lvl9pPr marL="911840" indent="0">
+              <a:buNone/>
+              <a:defRPr sz="499"/>
             </a:lvl9pPr>
           </a:lstStyle>
           <a:p>
@@ -2338,8 +2402,8 @@
         </p:nvSpPr>
         <p:spPr>
           <a:xfrm>
-            <a:off x="285178" y="415766"/>
-            <a:ext cx="1335322" cy="770259"/>
+            <a:off x="285178" y="512922"/>
+            <a:ext cx="1335322" cy="950250"/>
           </a:xfrm>
         </p:spPr>
         <p:txBody>
@@ -2347,39 +2411,39 @@
           <a:lstStyle>
             <a:lvl1pPr marL="0" indent="0">
               <a:buNone/>
-              <a:defRPr sz="323"/>
+              <a:defRPr sz="399"/>
             </a:lvl1pPr>
-            <a:lvl2pPr marL="92400" indent="0">
-              <a:buNone/>
-              <a:defRPr sz="283"/>
+            <a:lvl2pPr marL="113980" indent="0">
+              <a:buNone/>
+              <a:defRPr sz="349"/>
             </a:lvl2pPr>
-            <a:lvl3pPr marL="184800" indent="0">
-              <a:buNone/>
-              <a:defRPr sz="243"/>
+            <a:lvl3pPr marL="227960" indent="0">
+              <a:buNone/>
+              <a:defRPr sz="299"/>
             </a:lvl3pPr>
-            <a:lvl4pPr marL="277200" indent="0">
-              <a:buNone/>
-              <a:defRPr sz="202"/>
+            <a:lvl4pPr marL="341940" indent="0">
+              <a:buNone/>
+              <a:defRPr sz="249"/>
             </a:lvl4pPr>
-            <a:lvl5pPr marL="369600" indent="0">
-              <a:buNone/>
-              <a:defRPr sz="202"/>
+            <a:lvl5pPr marL="455920" indent="0">
+              <a:buNone/>
+              <a:defRPr sz="249"/>
             </a:lvl5pPr>
-            <a:lvl6pPr marL="462001" indent="0">
-              <a:buNone/>
-              <a:defRPr sz="202"/>
+            <a:lvl6pPr marL="569900" indent="0">
+              <a:buNone/>
+              <a:defRPr sz="249"/>
             </a:lvl6pPr>
-            <a:lvl7pPr marL="554401" indent="0">
-              <a:buNone/>
-              <a:defRPr sz="202"/>
+            <a:lvl7pPr marL="683880" indent="0">
+              <a:buNone/>
+              <a:defRPr sz="249"/>
             </a:lvl7pPr>
-            <a:lvl8pPr marL="646801" indent="0">
-              <a:buNone/>
-              <a:defRPr sz="202"/>
+            <a:lvl8pPr marL="797860" indent="0">
+              <a:buNone/>
+              <a:defRPr sz="249"/>
             </a:lvl8pPr>
-            <a:lvl9pPr marL="739201" indent="0">
-              <a:buNone/>
-              <a:defRPr sz="202"/>
+            <a:lvl9pPr marL="911840" indent="0">
+              <a:buNone/>
+              <a:defRPr sz="249"/>
             </a:lvl9pPr>
           </a:lstStyle>
           <a:p>
@@ -2408,7 +2472,7 @@
           <a:p>
             <a:fld id="{1FB3EBC5-2BAE-4ECB-A995-B52653FE7498}" type="datetimeFigureOut">
               <a:rPr lang="en-GB" smtClean="0"/>
-              <a:t>13/05/2025</a:t>
+              <a:t>14/05/2025</a:t>
             </a:fld>
             <a:endParaRPr lang="en-GB"/>
           </a:p>
@@ -2459,7 +2523,7 @@
     </p:spTree>
     <p:extLst>
       <p:ext uri="{BB962C8B-B14F-4D97-AF65-F5344CB8AC3E}">
-        <p14:creationId xmlns:p14="http://schemas.microsoft.com/office/powerpoint/2010/main" val="623368787"/>
+        <p14:creationId xmlns:p14="http://schemas.microsoft.com/office/powerpoint/2010/main" val="2339444876"/>
       </p:ext>
     </p:extLst>
   </p:cSld>
@@ -2503,8 +2567,8 @@
         </p:nvSpPr>
         <p:spPr>
           <a:xfrm>
-            <a:off x="284639" y="73786"/>
-            <a:ext cx="3570923" cy="267874"/>
+            <a:off x="284639" y="91028"/>
+            <a:ext cx="3570923" cy="330470"/>
           </a:xfrm>
           <a:prstGeom prst="rect">
             <a:avLst/>
@@ -2536,8 +2600,8 @@
         </p:nvSpPr>
         <p:spPr>
           <a:xfrm>
-            <a:off x="284639" y="368929"/>
-            <a:ext cx="3570923" cy="879333"/>
+            <a:off x="284639" y="455139"/>
+            <a:ext cx="3570923" cy="1084813"/>
           </a:xfrm>
           <a:prstGeom prst="rect">
             <a:avLst/>
@@ -2598,8 +2662,8 @@
         </p:nvSpPr>
         <p:spPr>
           <a:xfrm>
-            <a:off x="284639" y="1284513"/>
-            <a:ext cx="931545" cy="73786"/>
+            <a:off x="284639" y="1584674"/>
+            <a:ext cx="931545" cy="91028"/>
           </a:xfrm>
           <a:prstGeom prst="rect">
             <a:avLst/>
@@ -2609,7 +2673,7 @@
           <a:bodyPr vert="horz" lIns="91440" tIns="45720" rIns="91440" bIns="45720" rtlCol="0" anchor="ctr"/>
           <a:lstStyle>
             <a:lvl1pPr algn="l">
-              <a:defRPr sz="243">
+              <a:defRPr sz="299">
                 <a:solidFill>
                   <a:schemeClr val="tx1">
                     <a:tint val="82000"/>
@@ -2621,7 +2685,7 @@
           <a:p>
             <a:fld id="{1FB3EBC5-2BAE-4ECB-A995-B52653FE7498}" type="datetimeFigureOut">
               <a:rPr lang="en-GB" smtClean="0"/>
-              <a:t>13/05/2025</a:t>
+              <a:t>14/05/2025</a:t>
             </a:fld>
             <a:endParaRPr lang="en-GB"/>
           </a:p>
@@ -2639,8 +2703,8 @@
         </p:nvSpPr>
         <p:spPr>
           <a:xfrm>
-            <a:off x="1371441" y="1284513"/>
-            <a:ext cx="1397318" cy="73786"/>
+            <a:off x="1371441" y="1584674"/>
+            <a:ext cx="1397318" cy="91028"/>
           </a:xfrm>
           <a:prstGeom prst="rect">
             <a:avLst/>
@@ -2650,7 +2714,7 @@
           <a:bodyPr vert="horz" lIns="91440" tIns="45720" rIns="91440" bIns="45720" rtlCol="0" anchor="ctr"/>
           <a:lstStyle>
             <a:lvl1pPr algn="ctr">
-              <a:defRPr sz="243">
+              <a:defRPr sz="299">
                 <a:solidFill>
                   <a:schemeClr val="tx1">
                     <a:tint val="82000"/>
@@ -2676,8 +2740,8 @@
         </p:nvSpPr>
         <p:spPr>
           <a:xfrm>
-            <a:off x="2924016" y="1284513"/>
-            <a:ext cx="931545" cy="73786"/>
+            <a:off x="2924016" y="1584674"/>
+            <a:ext cx="931545" cy="91028"/>
           </a:xfrm>
           <a:prstGeom prst="rect">
             <a:avLst/>
@@ -2687,7 +2751,7 @@
           <a:bodyPr vert="horz" lIns="91440" tIns="45720" rIns="91440" bIns="45720" rtlCol="0" anchor="ctr"/>
           <a:lstStyle>
             <a:lvl1pPr algn="r">
-              <a:defRPr sz="243">
+              <a:defRPr sz="299">
                 <a:solidFill>
                   <a:schemeClr val="tx1">
                     <a:tint val="82000"/>
@@ -2708,27 +2772,27 @@
     </p:spTree>
     <p:extLst>
       <p:ext uri="{BB962C8B-B14F-4D97-AF65-F5344CB8AC3E}">
-        <p14:creationId xmlns:p14="http://schemas.microsoft.com/office/powerpoint/2010/main" val="750113848"/>
+        <p14:creationId xmlns:p14="http://schemas.microsoft.com/office/powerpoint/2010/main" val="1615797320"/>
       </p:ext>
     </p:extLst>
   </p:cSld>
   <p:clrMap bg1="lt1" tx1="dk1" bg2="lt2" tx2="dk2" accent1="accent1" accent2="accent2" accent3="accent3" accent4="accent4" accent5="accent5" accent6="accent6" hlink="hlink" folHlink="folHlink"/>
   <p:sldLayoutIdLst>
-    <p:sldLayoutId id="2147483673" r:id="rId1"/>
-    <p:sldLayoutId id="2147483674" r:id="rId2"/>
-    <p:sldLayoutId id="2147483675" r:id="rId3"/>
-    <p:sldLayoutId id="2147483676" r:id="rId4"/>
-    <p:sldLayoutId id="2147483677" r:id="rId5"/>
-    <p:sldLayoutId id="2147483678" r:id="rId6"/>
-    <p:sldLayoutId id="2147483679" r:id="rId7"/>
-    <p:sldLayoutId id="2147483680" r:id="rId8"/>
-    <p:sldLayoutId id="2147483681" r:id="rId9"/>
-    <p:sldLayoutId id="2147483682" r:id="rId10"/>
-    <p:sldLayoutId id="2147483683" r:id="rId11"/>
+    <p:sldLayoutId id="2147483697" r:id="rId1"/>
+    <p:sldLayoutId id="2147483698" r:id="rId2"/>
+    <p:sldLayoutId id="2147483699" r:id="rId3"/>
+    <p:sldLayoutId id="2147483700" r:id="rId4"/>
+    <p:sldLayoutId id="2147483701" r:id="rId5"/>
+    <p:sldLayoutId id="2147483702" r:id="rId6"/>
+    <p:sldLayoutId id="2147483703" r:id="rId7"/>
+    <p:sldLayoutId id="2147483704" r:id="rId8"/>
+    <p:sldLayoutId id="2147483705" r:id="rId9"/>
+    <p:sldLayoutId id="2147483706" r:id="rId10"/>
+    <p:sldLayoutId id="2147483707" r:id="rId11"/>
   </p:sldLayoutIdLst>
   <p:txStyles>
     <p:titleStyle>
-      <a:lvl1pPr algn="l" defTabSz="184800" rtl="0" eaLnBrk="1" latinLnBrk="0" hangingPunct="1">
+      <a:lvl1pPr algn="l" defTabSz="227960" rtl="0" eaLnBrk="1" latinLnBrk="0" hangingPunct="1">
         <a:lnSpc>
           <a:spcPct val="90000"/>
         </a:lnSpc>
@@ -2736,7 +2800,7 @@
           <a:spcPct val="0"/>
         </a:spcBef>
         <a:buNone/>
-        <a:defRPr sz="889" kern="1200">
+        <a:defRPr sz="1097" kern="1200">
           <a:solidFill>
             <a:schemeClr val="tx1"/>
           </a:solidFill>
@@ -2747,16 +2811,16 @@
       </a:lvl1pPr>
     </p:titleStyle>
     <p:bodyStyle>
-      <a:lvl1pPr marL="46200" indent="-46200" algn="l" defTabSz="184800" rtl="0" eaLnBrk="1" latinLnBrk="0" hangingPunct="1">
+      <a:lvl1pPr marL="56990" indent="-56990" algn="l" defTabSz="227960" rtl="0" eaLnBrk="1" latinLnBrk="0" hangingPunct="1">
         <a:lnSpc>
           <a:spcPct val="90000"/>
         </a:lnSpc>
         <a:spcBef>
-          <a:spcPts val="202"/>
+          <a:spcPts val="249"/>
         </a:spcBef>
         <a:buFont typeface="Arial" panose="020B0604020202020204" pitchFamily="34" charset="0"/>
         <a:buChar char="•"/>
-        <a:defRPr sz="566" kern="1200">
+        <a:defRPr sz="698" kern="1200">
           <a:solidFill>
             <a:schemeClr val="tx1"/>
           </a:solidFill>
@@ -2765,16 +2829,16 @@
           <a:cs typeface="+mn-cs"/>
         </a:defRPr>
       </a:lvl1pPr>
-      <a:lvl2pPr marL="138600" indent="-46200" algn="l" defTabSz="184800" rtl="0" eaLnBrk="1" latinLnBrk="0" hangingPunct="1">
+      <a:lvl2pPr marL="170970" indent="-56990" algn="l" defTabSz="227960" rtl="0" eaLnBrk="1" latinLnBrk="0" hangingPunct="1">
         <a:lnSpc>
           <a:spcPct val="90000"/>
         </a:lnSpc>
         <a:spcBef>
-          <a:spcPts val="101"/>
+          <a:spcPts val="125"/>
         </a:spcBef>
         <a:buFont typeface="Arial" panose="020B0604020202020204" pitchFamily="34" charset="0"/>
         <a:buChar char="•"/>
-        <a:defRPr sz="485" kern="1200">
+        <a:defRPr sz="598" kern="1200">
           <a:solidFill>
             <a:schemeClr val="tx1"/>
           </a:solidFill>
@@ -2783,16 +2847,16 @@
           <a:cs typeface="+mn-cs"/>
         </a:defRPr>
       </a:lvl2pPr>
-      <a:lvl3pPr marL="231000" indent="-46200" algn="l" defTabSz="184800" rtl="0" eaLnBrk="1" latinLnBrk="0" hangingPunct="1">
+      <a:lvl3pPr marL="284950" indent="-56990" algn="l" defTabSz="227960" rtl="0" eaLnBrk="1" latinLnBrk="0" hangingPunct="1">
         <a:lnSpc>
           <a:spcPct val="90000"/>
         </a:lnSpc>
         <a:spcBef>
-          <a:spcPts val="101"/>
+          <a:spcPts val="125"/>
         </a:spcBef>
         <a:buFont typeface="Arial" panose="020B0604020202020204" pitchFamily="34" charset="0"/>
         <a:buChar char="•"/>
-        <a:defRPr sz="404" kern="1200">
+        <a:defRPr sz="499" kern="1200">
           <a:solidFill>
             <a:schemeClr val="tx1"/>
           </a:solidFill>
@@ -2801,16 +2865,16 @@
           <a:cs typeface="+mn-cs"/>
         </a:defRPr>
       </a:lvl3pPr>
-      <a:lvl4pPr marL="323400" indent="-46200" algn="l" defTabSz="184800" rtl="0" eaLnBrk="1" latinLnBrk="0" hangingPunct="1">
+      <a:lvl4pPr marL="398930" indent="-56990" algn="l" defTabSz="227960" rtl="0" eaLnBrk="1" latinLnBrk="0" hangingPunct="1">
         <a:lnSpc>
           <a:spcPct val="90000"/>
         </a:lnSpc>
         <a:spcBef>
-          <a:spcPts val="101"/>
+          <a:spcPts val="125"/>
         </a:spcBef>
         <a:buFont typeface="Arial" panose="020B0604020202020204" pitchFamily="34" charset="0"/>
         <a:buChar char="•"/>
-        <a:defRPr sz="364" kern="1200">
+        <a:defRPr sz="449" kern="1200">
           <a:solidFill>
             <a:schemeClr val="tx1"/>
           </a:solidFill>
@@ -2819,16 +2883,16 @@
           <a:cs typeface="+mn-cs"/>
         </a:defRPr>
       </a:lvl4pPr>
-      <a:lvl5pPr marL="415801" indent="-46200" algn="l" defTabSz="184800" rtl="0" eaLnBrk="1" latinLnBrk="0" hangingPunct="1">
+      <a:lvl5pPr marL="512910" indent="-56990" algn="l" defTabSz="227960" rtl="0" eaLnBrk="1" latinLnBrk="0" hangingPunct="1">
         <a:lnSpc>
           <a:spcPct val="90000"/>
         </a:lnSpc>
         <a:spcBef>
-          <a:spcPts val="101"/>
+          <a:spcPts val="125"/>
         </a:spcBef>
         <a:buFont typeface="Arial" panose="020B0604020202020204" pitchFamily="34" charset="0"/>
         <a:buChar char="•"/>
-        <a:defRPr sz="364" kern="1200">
+        <a:defRPr sz="449" kern="1200">
           <a:solidFill>
             <a:schemeClr val="tx1"/>
           </a:solidFill>
@@ -2837,16 +2901,16 @@
           <a:cs typeface="+mn-cs"/>
         </a:defRPr>
       </a:lvl5pPr>
-      <a:lvl6pPr marL="508201" indent="-46200" algn="l" defTabSz="184800" rtl="0" eaLnBrk="1" latinLnBrk="0" hangingPunct="1">
+      <a:lvl6pPr marL="626890" indent="-56990" algn="l" defTabSz="227960" rtl="0" eaLnBrk="1" latinLnBrk="0" hangingPunct="1">
         <a:lnSpc>
           <a:spcPct val="90000"/>
         </a:lnSpc>
         <a:spcBef>
-          <a:spcPts val="101"/>
+          <a:spcPts val="125"/>
         </a:spcBef>
         <a:buFont typeface="Arial" panose="020B0604020202020204" pitchFamily="34" charset="0"/>
         <a:buChar char="•"/>
-        <a:defRPr sz="364" kern="1200">
+        <a:defRPr sz="449" kern="1200">
           <a:solidFill>
             <a:schemeClr val="tx1"/>
           </a:solidFill>
@@ -2855,16 +2919,16 @@
           <a:cs typeface="+mn-cs"/>
         </a:defRPr>
       </a:lvl6pPr>
-      <a:lvl7pPr marL="600601" indent="-46200" algn="l" defTabSz="184800" rtl="0" eaLnBrk="1" latinLnBrk="0" hangingPunct="1">
+      <a:lvl7pPr marL="740870" indent="-56990" algn="l" defTabSz="227960" rtl="0" eaLnBrk="1" latinLnBrk="0" hangingPunct="1">
         <a:lnSpc>
           <a:spcPct val="90000"/>
         </a:lnSpc>
         <a:spcBef>
-          <a:spcPts val="101"/>
+          <a:spcPts val="125"/>
         </a:spcBef>
         <a:buFont typeface="Arial" panose="020B0604020202020204" pitchFamily="34" charset="0"/>
         <a:buChar char="•"/>
-        <a:defRPr sz="364" kern="1200">
+        <a:defRPr sz="449" kern="1200">
           <a:solidFill>
             <a:schemeClr val="tx1"/>
           </a:solidFill>
@@ -2873,16 +2937,16 @@
           <a:cs typeface="+mn-cs"/>
         </a:defRPr>
       </a:lvl7pPr>
-      <a:lvl8pPr marL="693001" indent="-46200" algn="l" defTabSz="184800" rtl="0" eaLnBrk="1" latinLnBrk="0" hangingPunct="1">
+      <a:lvl8pPr marL="854850" indent="-56990" algn="l" defTabSz="227960" rtl="0" eaLnBrk="1" latinLnBrk="0" hangingPunct="1">
         <a:lnSpc>
           <a:spcPct val="90000"/>
         </a:lnSpc>
         <a:spcBef>
-          <a:spcPts val="101"/>
+          <a:spcPts val="125"/>
         </a:spcBef>
         <a:buFont typeface="Arial" panose="020B0604020202020204" pitchFamily="34" charset="0"/>
         <a:buChar char="•"/>
-        <a:defRPr sz="364" kern="1200">
+        <a:defRPr sz="449" kern="1200">
           <a:solidFill>
             <a:schemeClr val="tx1"/>
           </a:solidFill>
@@ -2891,16 +2955,16 @@
           <a:cs typeface="+mn-cs"/>
         </a:defRPr>
       </a:lvl8pPr>
-      <a:lvl9pPr marL="785401" indent="-46200" algn="l" defTabSz="184800" rtl="0" eaLnBrk="1" latinLnBrk="0" hangingPunct="1">
+      <a:lvl9pPr marL="968830" indent="-56990" algn="l" defTabSz="227960" rtl="0" eaLnBrk="1" latinLnBrk="0" hangingPunct="1">
         <a:lnSpc>
           <a:spcPct val="90000"/>
         </a:lnSpc>
         <a:spcBef>
-          <a:spcPts val="101"/>
+          <a:spcPts val="125"/>
         </a:spcBef>
         <a:buFont typeface="Arial" panose="020B0604020202020204" pitchFamily="34" charset="0"/>
         <a:buChar char="•"/>
-        <a:defRPr sz="364" kern="1200">
+        <a:defRPr sz="449" kern="1200">
           <a:solidFill>
             <a:schemeClr val="tx1"/>
           </a:solidFill>
@@ -2914,8 +2978,8 @@
       <a:defPPr>
         <a:defRPr lang="en-US"/>
       </a:defPPr>
-      <a:lvl1pPr marL="0" algn="l" defTabSz="184800" rtl="0" eaLnBrk="1" latinLnBrk="0" hangingPunct="1">
-        <a:defRPr sz="364" kern="1200">
+      <a:lvl1pPr marL="0" algn="l" defTabSz="227960" rtl="0" eaLnBrk="1" latinLnBrk="0" hangingPunct="1">
+        <a:defRPr sz="449" kern="1200">
           <a:solidFill>
             <a:schemeClr val="tx1"/>
           </a:solidFill>
@@ -2924,8 +2988,8 @@
           <a:cs typeface="+mn-cs"/>
         </a:defRPr>
       </a:lvl1pPr>
-      <a:lvl2pPr marL="92400" algn="l" defTabSz="184800" rtl="0" eaLnBrk="1" latinLnBrk="0" hangingPunct="1">
-        <a:defRPr sz="364" kern="1200">
+      <a:lvl2pPr marL="113980" algn="l" defTabSz="227960" rtl="0" eaLnBrk="1" latinLnBrk="0" hangingPunct="1">
+        <a:defRPr sz="449" kern="1200">
           <a:solidFill>
             <a:schemeClr val="tx1"/>
           </a:solidFill>
@@ -2934,8 +2998,8 @@
           <a:cs typeface="+mn-cs"/>
         </a:defRPr>
       </a:lvl2pPr>
-      <a:lvl3pPr marL="184800" algn="l" defTabSz="184800" rtl="0" eaLnBrk="1" latinLnBrk="0" hangingPunct="1">
-        <a:defRPr sz="364" kern="1200">
+      <a:lvl3pPr marL="227960" algn="l" defTabSz="227960" rtl="0" eaLnBrk="1" latinLnBrk="0" hangingPunct="1">
+        <a:defRPr sz="449" kern="1200">
           <a:solidFill>
             <a:schemeClr val="tx1"/>
           </a:solidFill>
@@ -2944,8 +3008,8 @@
           <a:cs typeface="+mn-cs"/>
         </a:defRPr>
       </a:lvl3pPr>
-      <a:lvl4pPr marL="277200" algn="l" defTabSz="184800" rtl="0" eaLnBrk="1" latinLnBrk="0" hangingPunct="1">
-        <a:defRPr sz="364" kern="1200">
+      <a:lvl4pPr marL="341940" algn="l" defTabSz="227960" rtl="0" eaLnBrk="1" latinLnBrk="0" hangingPunct="1">
+        <a:defRPr sz="449" kern="1200">
           <a:solidFill>
             <a:schemeClr val="tx1"/>
           </a:solidFill>
@@ -2954,8 +3018,8 @@
           <a:cs typeface="+mn-cs"/>
         </a:defRPr>
       </a:lvl4pPr>
-      <a:lvl5pPr marL="369600" algn="l" defTabSz="184800" rtl="0" eaLnBrk="1" latinLnBrk="0" hangingPunct="1">
-        <a:defRPr sz="364" kern="1200">
+      <a:lvl5pPr marL="455920" algn="l" defTabSz="227960" rtl="0" eaLnBrk="1" latinLnBrk="0" hangingPunct="1">
+        <a:defRPr sz="449" kern="1200">
           <a:solidFill>
             <a:schemeClr val="tx1"/>
           </a:solidFill>
@@ -2964,8 +3028,8 @@
           <a:cs typeface="+mn-cs"/>
         </a:defRPr>
       </a:lvl5pPr>
-      <a:lvl6pPr marL="462001" algn="l" defTabSz="184800" rtl="0" eaLnBrk="1" latinLnBrk="0" hangingPunct="1">
-        <a:defRPr sz="364" kern="1200">
+      <a:lvl6pPr marL="569900" algn="l" defTabSz="227960" rtl="0" eaLnBrk="1" latinLnBrk="0" hangingPunct="1">
+        <a:defRPr sz="449" kern="1200">
           <a:solidFill>
             <a:schemeClr val="tx1"/>
           </a:solidFill>
@@ -2974,8 +3038,8 @@
           <a:cs typeface="+mn-cs"/>
         </a:defRPr>
       </a:lvl6pPr>
-      <a:lvl7pPr marL="554401" algn="l" defTabSz="184800" rtl="0" eaLnBrk="1" latinLnBrk="0" hangingPunct="1">
-        <a:defRPr sz="364" kern="1200">
+      <a:lvl7pPr marL="683880" algn="l" defTabSz="227960" rtl="0" eaLnBrk="1" latinLnBrk="0" hangingPunct="1">
+        <a:defRPr sz="449" kern="1200">
           <a:solidFill>
             <a:schemeClr val="tx1"/>
           </a:solidFill>
@@ -2984,8 +3048,8 @@
           <a:cs typeface="+mn-cs"/>
         </a:defRPr>
       </a:lvl7pPr>
-      <a:lvl8pPr marL="646801" algn="l" defTabSz="184800" rtl="0" eaLnBrk="1" latinLnBrk="0" hangingPunct="1">
-        <a:defRPr sz="364" kern="1200">
+      <a:lvl8pPr marL="797860" algn="l" defTabSz="227960" rtl="0" eaLnBrk="1" latinLnBrk="0" hangingPunct="1">
+        <a:defRPr sz="449" kern="1200">
           <a:solidFill>
             <a:schemeClr val="tx1"/>
           </a:solidFill>
@@ -2994,8 +3058,8 @@
           <a:cs typeface="+mn-cs"/>
         </a:defRPr>
       </a:lvl8pPr>
-      <a:lvl9pPr marL="739201" algn="l" defTabSz="184800" rtl="0" eaLnBrk="1" latinLnBrk="0" hangingPunct="1">
-        <a:defRPr sz="364" kern="1200">
+      <a:lvl9pPr marL="911840" algn="l" defTabSz="227960" rtl="0" eaLnBrk="1" latinLnBrk="0" hangingPunct="1">
+        <a:defRPr sz="449" kern="1200">
           <a:solidFill>
             <a:schemeClr val="tx1"/>
           </a:solidFill>
@@ -3028,7 +3092,7 @@
       </p:grpSpPr>
       <p:graphicFrame>
         <p:nvGraphicFramePr>
-          <p:cNvPr id="6" name="Table 5">
+          <p:cNvPr id="5" name="Table 4">
             <a:extLst>
               <a:ext uri="{FF2B5EF4-FFF2-40B4-BE49-F238E27FC236}">
                 <a16:creationId xmlns:a16="http://schemas.microsoft.com/office/drawing/2014/main" id="{15623DAB-A4E1-DF1C-9B96-E2C1CE9DE49A}"/>
@@ -3041,14 +3105,14 @@
           <p:nvPr>
             <p:extLst>
               <p:ext uri="{D42A27DB-BD31-4B8C-83A1-F6EECF244321}">
-                <p14:modId xmlns:p14="http://schemas.microsoft.com/office/powerpoint/2010/main" val="2347105751"/>
+                <p14:modId xmlns:p14="http://schemas.microsoft.com/office/powerpoint/2010/main" val="814356020"/>
               </p:ext>
             </p:extLst>
           </p:nvPr>
         </p:nvGraphicFramePr>
         <p:xfrm>
           <a:off x="1" y="0"/>
-          <a:ext cx="4140200" cy="1386000"/>
+          <a:ext cx="4140200" cy="1357200"/>
         </p:xfrm>
         <a:graphic>
           <a:graphicData uri="http://schemas.openxmlformats.org/drawingml/2006/table">
@@ -3057,35 +3121,35 @@
                 <a:tableStyleId>{5202B0CA-FC54-4496-8BCA-5EF66A818D29}</a:tableStyleId>
               </a:tblPr>
               <a:tblGrid>
-                <a:gridCol w="771524">
+                <a:gridCol w="800099">
                   <a:extLst>
                     <a:ext uri="{9D8B030D-6E8A-4147-A177-3AD203B41FA5}">
                       <a16:colId xmlns:a16="http://schemas.microsoft.com/office/drawing/2014/main" val="1840348847"/>
                     </a:ext>
                   </a:extLst>
                 </a:gridCol>
-                <a:gridCol w="819150">
-                  <a:extLst>
-                    <a:ext uri="{9D8B030D-6E8A-4147-A177-3AD203B41FA5}">
-                      <a16:colId xmlns:a16="http://schemas.microsoft.com/office/drawing/2014/main" val="3011250887"/>
-                    </a:ext>
-                  </a:extLst>
-                </a:gridCol>
-                <a:gridCol w="762000">
+                <a:gridCol w="647700">
                   <a:extLst>
                     <a:ext uri="{9D8B030D-6E8A-4147-A177-3AD203B41FA5}">
                       <a16:colId xmlns:a16="http://schemas.microsoft.com/office/drawing/2014/main" val="950765403"/>
                     </a:ext>
                   </a:extLst>
                 </a:gridCol>
-                <a:gridCol w="771525">
+                <a:gridCol w="657225">
                   <a:extLst>
                     <a:ext uri="{9D8B030D-6E8A-4147-A177-3AD203B41FA5}">
                       <a16:colId xmlns:a16="http://schemas.microsoft.com/office/drawing/2014/main" val="1151685360"/>
                     </a:ext>
                   </a:extLst>
                 </a:gridCol>
-                <a:gridCol w="1016001">
+                <a:gridCol w="1219200">
+                  <a:extLst>
+                    <a:ext uri="{9D8B030D-6E8A-4147-A177-3AD203B41FA5}">
+                      <a16:colId xmlns:a16="http://schemas.microsoft.com/office/drawing/2014/main" val="66260659"/>
+                    </a:ext>
+                  </a:extLst>
+                </a:gridCol>
+                <a:gridCol w="815976">
                   <a:extLst>
                     <a:ext uri="{9D8B030D-6E8A-4147-A177-3AD203B41FA5}">
                       <a16:colId xmlns:a16="http://schemas.microsoft.com/office/drawing/2014/main" val="1105057418"/>
@@ -3093,7 +3157,7 @@
                   </a:extLst>
                 </a:gridCol>
               </a:tblGrid>
-              <a:tr h="666000">
+              <a:tr h="540000">
                 <a:tc>
                   <a:txBody>
                     <a:bodyPr/>
@@ -3112,71 +3176,6 @@
                         </a:rPr>
                         <a:t>Forecast</a:t>
                       </a:r>
-                      <a:endParaRPr lang="en-GB" sz="800" dirty="0">
-                        <a:solidFill>
-                          <a:schemeClr val="tx1">
-                            <a:lumMod val="95000"/>
-                            <a:lumOff val="5000"/>
-                          </a:schemeClr>
-                        </a:solidFill>
-                        <a:latin typeface="Avenir Next LT Pro Demi" panose="020B0704020202020204" pitchFamily="34" charset="0"/>
-                      </a:endParaRPr>
-                    </a:p>
-                  </a:txBody>
-                  <a:tcPr anchor="ctr">
-                    <a:solidFill>
-                      <a:schemeClr val="bg1">
-                        <a:lumMod val="85000"/>
-                      </a:schemeClr>
-                    </a:solidFill>
-                  </a:tcPr>
-                </a:tc>
-                <a:tc>
-                  <a:txBody>
-                    <a:bodyPr/>
-                    <a:lstStyle/>
-                    <a:p>
-                      <a:pPr marL="0" marR="0" lvl="0" indent="0" algn="ctr" defTabSz="414040" rtl="0" eaLnBrk="1" fontAlgn="auto" latinLnBrk="0" hangingPunct="1">
-                        <a:lnSpc>
-                          <a:spcPct val="100000"/>
-                        </a:lnSpc>
-                        <a:spcBef>
-                          <a:spcPts val="0"/>
-                        </a:spcBef>
-                        <a:spcAft>
-                          <a:spcPts val="0"/>
-                        </a:spcAft>
-                        <a:buClrTx/>
-                        <a:buSzTx/>
-                        <a:buFontTx/>
-                        <a:buNone/>
-                        <a:tabLst/>
-                        <a:defRPr/>
-                      </a:pPr>
-                      <a:r>
-                        <a:rPr lang="en-US" sz="800" dirty="0">
-                          <a:solidFill>
-                            <a:schemeClr val="tx1">
-                              <a:lumMod val="95000"/>
-                              <a:lumOff val="5000"/>
-                            </a:schemeClr>
-                          </a:solidFill>
-                          <a:latin typeface="Avenir Next LT Pro Demi" panose="020B0704020202020204" pitchFamily="34" charset="0"/>
-                        </a:rPr>
-                        <a:t>Temporal Range</a:t>
-                      </a:r>
-                      <a:endParaRPr lang="en-GB" sz="800" dirty="0">
-                        <a:solidFill>
-                          <a:schemeClr val="tx1">
-                            <a:lumMod val="95000"/>
-                            <a:lumOff val="5000"/>
-                          </a:schemeClr>
-                        </a:solidFill>
-                        <a:latin typeface="Avenir Next LT Pro Demi" panose="020B0704020202020204" pitchFamily="34" charset="0"/>
-                      </a:endParaRPr>
-                    </a:p>
-                    <a:p>
-                      <a:pPr algn="ctr"/>
                       <a:endParaRPr lang="en-GB" sz="800" dirty="0">
                         <a:solidFill>
                           <a:schemeClr val="tx1">
@@ -3279,7 +3278,22 @@
                           </a:solidFill>
                           <a:latin typeface="Avenir Next LT Pro Demi" panose="020B0704020202020204" pitchFamily="34" charset="0"/>
                         </a:rPr>
-                        <a:t>Time (hours)</a:t>
+                        <a:t>Time </a:t>
+                      </a:r>
+                    </a:p>
+                    <a:p>
+                      <a:pPr algn="ctr"/>
+                      <a:r>
+                        <a:rPr lang="en-US" sz="800" dirty="0">
+                          <a:solidFill>
+                            <a:schemeClr val="tx1">
+                              <a:lumMod val="95000"/>
+                              <a:lumOff val="5000"/>
+                            </a:schemeClr>
+                          </a:solidFill>
+                          <a:latin typeface="Avenir Next LT Pro Demi" panose="020B0704020202020204" pitchFamily="34" charset="0"/>
+                        </a:rPr>
+                        <a:t>(hours)</a:t>
                       </a:r>
                       <a:endParaRPr lang="en-GB" sz="800" dirty="0">
                         <a:solidFill>
@@ -3332,7 +3346,91 @@
                           </a:solidFill>
                           <a:latin typeface="Avenir Next LT Pro Demi" panose="020B0704020202020204" pitchFamily="34" charset="0"/>
                         </a:rPr>
-                        <a:t>Experiment Version in Mars Catalogue</a:t>
+                        <a:t>Temporal </a:t>
+                      </a:r>
+                    </a:p>
+                    <a:p>
+                      <a:pPr marL="0" marR="0" lvl="0" indent="0" algn="ctr" defTabSz="414040" rtl="0" eaLnBrk="1" fontAlgn="auto" latinLnBrk="0" hangingPunct="1">
+                        <a:lnSpc>
+                          <a:spcPct val="100000"/>
+                        </a:lnSpc>
+                        <a:spcBef>
+                          <a:spcPts val="0"/>
+                        </a:spcBef>
+                        <a:spcAft>
+                          <a:spcPts val="0"/>
+                        </a:spcAft>
+                        <a:buClrTx/>
+                        <a:buSzTx/>
+                        <a:buFontTx/>
+                        <a:buNone/>
+                        <a:tabLst/>
+                        <a:defRPr/>
+                      </a:pPr>
+                      <a:r>
+                        <a:rPr lang="en-US" sz="800" dirty="0">
+                          <a:solidFill>
+                            <a:schemeClr val="tx1">
+                              <a:lumMod val="95000"/>
+                              <a:lumOff val="5000"/>
+                            </a:schemeClr>
+                          </a:solidFill>
+                          <a:latin typeface="Avenir Next LT Pro Demi" panose="020B0704020202020204" pitchFamily="34" charset="0"/>
+                        </a:rPr>
+                        <a:t>Resolution</a:t>
+                      </a:r>
+                      <a:endParaRPr lang="en-GB" sz="800" dirty="0">
+                        <a:solidFill>
+                          <a:schemeClr val="tx1">
+                            <a:lumMod val="95000"/>
+                            <a:lumOff val="5000"/>
+                          </a:schemeClr>
+                        </a:solidFill>
+                        <a:latin typeface="Avenir Next LT Pro Demi" panose="020B0704020202020204" pitchFamily="34" charset="0"/>
+                      </a:endParaRPr>
+                    </a:p>
+                  </a:txBody>
+                  <a:tcPr anchor="ctr">
+                    <a:solidFill>
+                      <a:schemeClr val="bg1">
+                        <a:lumMod val="85000"/>
+                      </a:schemeClr>
+                    </a:solidFill>
+                  </a:tcPr>
+                </a:tc>
+                <a:tc>
+                  <a:txBody>
+                    <a:bodyPr/>
+                    <a:lstStyle/>
+                    <a:p>
+                      <a:pPr marL="0" marR="0" lvl="0" indent="0" algn="ctr" defTabSz="414040" rtl="0" eaLnBrk="1" fontAlgn="auto" latinLnBrk="0" hangingPunct="1">
+                        <a:lnSpc>
+                          <a:spcPct val="100000"/>
+                        </a:lnSpc>
+                        <a:spcBef>
+                          <a:spcPts val="0"/>
+                        </a:spcBef>
+                        <a:spcAft>
+                          <a:spcPts val="0"/>
+                        </a:spcAft>
+                        <a:buClrTx/>
+                        <a:buSzTx/>
+                        <a:buFontTx/>
+                        <a:buNone/>
+                        <a:tabLst/>
+                        <a:defRPr/>
+                      </a:pPr>
+                      <a:r>
+                        <a:rPr lang="en-US" sz="800" dirty="0">
+                          <a:solidFill>
+                            <a:schemeClr val="tx1">
+                              <a:lumMod val="95000"/>
+                              <a:lumOff val="5000"/>
+                            </a:schemeClr>
+                          </a:solidFill>
+                          <a:latin typeface="Avenir Next LT Pro Demi" panose="020B0704020202020204" pitchFamily="34" charset="0"/>
+                        </a:rPr>
+                        <a:t>Version in Mars Archive</a:t>
                       </a:r>
                       <a:endParaRPr lang="en-GB" sz="800" dirty="0">
                         <a:solidFill>
@@ -3379,30 +3477,7 @@
                         <a:rPr lang="en-US" sz="800" dirty="0">
                           <a:latin typeface="Avenir Next LT Pro" panose="020B0504020202020204" pitchFamily="34" charset="0"/>
                         </a:rPr>
-                        <a:t>“Reanalysis”</a:t>
-                      </a:r>
-                      <a:endParaRPr lang="en-GB" sz="800" dirty="0">
-                        <a:latin typeface="Avenir Next LT Pro" panose="020B0504020202020204" pitchFamily="34" charset="0"/>
-                      </a:endParaRPr>
-                    </a:p>
-                  </a:txBody>
-                  <a:tcPr anchor="ctr">
-                    <a:solidFill>
-                      <a:schemeClr val="bg1"/>
-                    </a:solidFill>
-                  </a:tcPr>
-                </a:tc>
-                <a:tc>
-                  <a:txBody>
-                    <a:bodyPr/>
-                    <a:lstStyle/>
-                    <a:p>
-                      <a:pPr algn="ctr"/>
-                      <a:r>
-                        <a:rPr lang="en-US" sz="800" dirty="0">
-                          <a:latin typeface="Avenir Next LT Pro" panose="020B0504020202020204" pitchFamily="34" charset="0"/>
-                        </a:rPr>
-                        <a:t>1940 to 2024</a:t>
+                        <a:t>(Reanalysis) *</a:t>
                       </a:r>
                       <a:endParaRPr lang="en-GB" sz="800" dirty="0">
                         <a:latin typeface="Avenir Next LT Pro" panose="020B0504020202020204" pitchFamily="34" charset="0"/>
@@ -3471,6 +3546,29 @@
                         <a:rPr lang="en-US" sz="800" dirty="0">
                           <a:latin typeface="Avenir Next LT Pro" panose="020B0504020202020204" pitchFamily="34" charset="0"/>
                         </a:rPr>
+                        <a:t>Hourly</a:t>
+                      </a:r>
+                      <a:endParaRPr lang="en-GB" sz="800" dirty="0">
+                        <a:latin typeface="Avenir Next LT Pro" panose="020B0504020202020204" pitchFamily="34" charset="0"/>
+                      </a:endParaRPr>
+                    </a:p>
+                  </a:txBody>
+                  <a:tcPr anchor="ctr">
+                    <a:solidFill>
+                      <a:schemeClr val="bg1"/>
+                    </a:solidFill>
+                  </a:tcPr>
+                </a:tc>
+                <a:tc>
+                  <a:txBody>
+                    <a:bodyPr/>
+                    <a:lstStyle/>
+                    <a:p>
+                      <a:pPr algn="ctr"/>
+                      <a:r>
+                        <a:rPr lang="en-US" sz="800" dirty="0">
+                          <a:latin typeface="Avenir Next LT Pro" panose="020B0504020202020204" pitchFamily="34" charset="0"/>
+                        </a:rPr>
                         <a:t>1</a:t>
                       </a:r>
                       <a:endParaRPr lang="en-GB" sz="800" dirty="0">
@@ -3501,32 +3599,7 @@
                         <a:rPr lang="en-US" sz="800" dirty="0">
                           <a:latin typeface="Avenir Next LT Pro" panose="020B0504020202020204" pitchFamily="34" charset="0"/>
                         </a:rPr>
-                        <a:t>Long-range</a:t>
-                      </a:r>
-                      <a:endParaRPr lang="en-GB" sz="800" dirty="0">
-                        <a:latin typeface="Avenir Next LT Pro" panose="020B0504020202020204" pitchFamily="34" charset="0"/>
-                      </a:endParaRPr>
-                    </a:p>
-                  </a:txBody>
-                  <a:tcPr anchor="ctr">
-                    <a:solidFill>
-                      <a:schemeClr val="bg1">
-                        <a:lumMod val="95000"/>
-                      </a:schemeClr>
-                    </a:solidFill>
-                  </a:tcPr>
-                </a:tc>
-                <a:tc>
-                  <a:txBody>
-                    <a:bodyPr/>
-                    <a:lstStyle/>
-                    <a:p>
-                      <a:pPr algn="ctr"/>
-                      <a:r>
-                        <a:rPr lang="en-US" sz="800" dirty="0">
-                          <a:latin typeface="Avenir Next LT Pro" panose="020B0504020202020204" pitchFamily="34" charset="0"/>
-                        </a:rPr>
-                        <a:t>1940 – 2024</a:t>
+                        <a:t>Long-range *</a:t>
                       </a:r>
                       <a:endParaRPr lang="en-GB" sz="800" dirty="0">
                         <a:latin typeface="Avenir Next LT Pro" panose="020B0504020202020204" pitchFamily="34" charset="0"/>
@@ -3601,6 +3674,49 @@
                         <a:rPr lang="en-US" sz="800" dirty="0">
                           <a:latin typeface="Avenir Next LT Pro" panose="020B0504020202020204" pitchFamily="34" charset="0"/>
                         </a:rPr>
+                        <a:t>3-hourly up to t+12</a:t>
+                      </a:r>
+                    </a:p>
+                    <a:p>
+                      <a:pPr algn="ctr"/>
+                      <a:r>
+                        <a:rPr lang="en-US" sz="800" dirty="0">
+                          <a:latin typeface="Avenir Next LT Pro" panose="020B0504020202020204" pitchFamily="34" charset="0"/>
+                        </a:rPr>
+                        <a:t>6-hourly up to t+120</a:t>
+                      </a:r>
+                    </a:p>
+                    <a:p>
+                      <a:pPr algn="ctr"/>
+                      <a:r>
+                        <a:rPr lang="en-US" sz="800" dirty="0">
+                          <a:latin typeface="Avenir Next LT Pro" panose="020B0504020202020204" pitchFamily="34" charset="0"/>
+                        </a:rPr>
+                        <a:t>12-hourly up to t+240</a:t>
+                      </a:r>
+                      <a:endParaRPr lang="en-GB" sz="800" dirty="0">
+                        <a:latin typeface="Avenir Next LT Pro" panose="020B0504020202020204" pitchFamily="34" charset="0"/>
+                      </a:endParaRPr>
+                    </a:p>
+                  </a:txBody>
+                  <a:tcPr anchor="ctr">
+                    <a:solidFill>
+                      <a:schemeClr val="bg1">
+                        <a:lumMod val="95000"/>
+                      </a:schemeClr>
+                    </a:solidFill>
+                  </a:tcPr>
+                </a:tc>
+                <a:tc>
+                  <a:txBody>
+                    <a:bodyPr/>
+                    <a:lstStyle/>
+                    <a:p>
+                      <a:pPr algn="ctr"/>
+                      <a:r>
+                        <a:rPr lang="en-US" sz="800" dirty="0">
+                          <a:latin typeface="Avenir Next LT Pro" panose="020B0504020202020204" pitchFamily="34" charset="0"/>
+                        </a:rPr>
                         <a:t>11</a:t>
                       </a:r>
                       <a:endParaRPr lang="en-GB" sz="800" dirty="0">
@@ -3626,6 +3742,43 @@
           </a:graphicData>
         </a:graphic>
       </p:graphicFrame>
+      <p:sp>
+        <p:nvSpPr>
+          <p:cNvPr id="7" name="TextBox 6">
+            <a:extLst>
+              <a:ext uri="{FF2B5EF4-FFF2-40B4-BE49-F238E27FC236}">
+                <a16:creationId xmlns:a16="http://schemas.microsoft.com/office/drawing/2014/main" id="{BFB118F7-3AF0-A668-608B-98A47405975A}"/>
+              </a:ext>
+            </a:extLst>
+          </p:cNvPr>
+          <p:cNvSpPr txBox="1"/>
+          <p:nvPr/>
+        </p:nvSpPr>
+        <p:spPr>
+          <a:xfrm>
+            <a:off x="-57150" y="1371600"/>
+            <a:ext cx="4140200" cy="338554"/>
+          </a:xfrm>
+          <a:prstGeom prst="rect">
+            <a:avLst/>
+          </a:prstGeom>
+          <a:noFill/>
+        </p:spPr>
+        <p:txBody>
+          <a:bodyPr wrap="square" rtlCol="0">
+            <a:spAutoFit/>
+          </a:bodyPr>
+          <a:lstStyle/>
+          <a:p>
+            <a:r>
+              <a:rPr lang="en-US" sz="800" dirty="0">
+                <a:latin typeface="Avenir Next LT Pro" panose="020B0504020202020204" pitchFamily="34" charset="0"/>
+              </a:rPr>
+              <a:t>* Model Version: IFS Cycle 31r2, Native spatial resolution: reduced-gaussian N320 (~31 km at the equator), Temporal range: 1940 to near real time (5-day latency)</a:t>
+            </a:r>
+          </a:p>
+        </p:txBody>
+      </p:sp>
     </p:spTree>
     <p:extLst>
       <p:ext uri="{BB962C8B-B14F-4D97-AF65-F5344CB8AC3E}">

</xml_diff>